<commit_message>
Jahreszahl, Body Page aktualisiert
</commit_message>
<xml_diff>
--- a/WebApp_TU.pptx
+++ b/WebApp_TU.pptx
@@ -1,6 +1,6 @@
 
 <file path=ppt/presentation.xml><?xml version="1.0" encoding="utf-8"?>
-<p:presentation xmlns:a="http://schemas.openxmlformats.org/drawingml/2006/main" xmlns:r="http://schemas.openxmlformats.org/officeDocument/2006/relationships" xmlns:p="http://schemas.openxmlformats.org/presentationml/2006/main" saveSubsetFonts="1">
+<p:presentation xmlns:a="http://schemas.openxmlformats.org/drawingml/2006/main" xmlns:r="http://schemas.openxmlformats.org/officeDocument/2006/relationships" xmlns:p="http://schemas.openxmlformats.org/presentationml/2006/main" showSpecialPlsOnTitleSld="0" saveSubsetFonts="1">
   <p:sldMasterIdLst>
     <p:sldMasterId id="2147483648" r:id="rId1"/>
   </p:sldMasterIdLst>
@@ -761,6 +761,91 @@
 </p:notesMaster>
 </file>
 
+<file path=ppt/notesSlides/notesSlide1.xml><?xml version="1.0" encoding="utf-8"?>
+<p:notes xmlns:a="http://schemas.openxmlformats.org/drawingml/2006/main" xmlns:r="http://schemas.openxmlformats.org/officeDocument/2006/relationships" xmlns:p="http://schemas.openxmlformats.org/presentationml/2006/main">
+  <p:cSld>
+    <p:spTree>
+      <p:nvGrpSpPr>
+        <p:cNvPr id="1" name=""/>
+        <p:cNvGrpSpPr/>
+        <p:nvPr/>
+      </p:nvGrpSpPr>
+      <p:grpSpPr>
+        <a:xfrm>
+          <a:off x="0" y="0"/>
+          <a:ext cx="0" cy="0"/>
+          <a:chOff x="0" y="0"/>
+          <a:chExt cx="0" cy="0"/>
+        </a:xfrm>
+      </p:grpSpPr>
+      <p:sp>
+        <p:nvSpPr>
+          <p:cNvPr id="2" name="Folienbildplatzhalter 1"/>
+          <p:cNvSpPr>
+            <a:spLocks noGrp="1" noRot="1" noChangeAspect="1"/>
+          </p:cNvSpPr>
+          <p:nvPr>
+            <p:ph type="sldImg"/>
+          </p:nvPr>
+        </p:nvSpPr>
+        <p:spPr/>
+      </p:sp>
+      <p:sp>
+        <p:nvSpPr>
+          <p:cNvPr id="3" name="Notizenplatzhalter 2"/>
+          <p:cNvSpPr>
+            <a:spLocks noGrp="1"/>
+          </p:cNvSpPr>
+          <p:nvPr>
+            <p:ph type="body" idx="1"/>
+          </p:nvPr>
+        </p:nvSpPr>
+        <p:spPr/>
+        <p:txBody>
+          <a:bodyPr/>
+          <a:lstStyle/>
+          <a:p>
+            <a:endParaRPr lang="de-DE" dirty="0"/>
+          </a:p>
+        </p:txBody>
+      </p:sp>
+      <p:sp>
+        <p:nvSpPr>
+          <p:cNvPr id="4" name="Foliennummernplatzhalter 3"/>
+          <p:cNvSpPr>
+            <a:spLocks noGrp="1"/>
+          </p:cNvSpPr>
+          <p:nvPr>
+            <p:ph type="sldNum" sz="quarter" idx="10"/>
+          </p:nvPr>
+        </p:nvSpPr>
+        <p:spPr/>
+        <p:txBody>
+          <a:bodyPr/>
+          <a:lstStyle/>
+          <a:p>
+            <a:fld id="{5015F803-1883-4DD3-8036-5F7271689D1E}" type="slidenum">
+              <a:rPr lang="de-DE" altLang="de-DE" smtClean="0"/>
+              <a:pPr/>
+              <a:t>23</a:t>
+            </a:fld>
+            <a:endParaRPr lang="de-DE" altLang="de-DE"/>
+          </a:p>
+        </p:txBody>
+      </p:sp>
+    </p:spTree>
+    <p:extLst>
+      <p:ext uri="{BB962C8B-B14F-4D97-AF65-F5344CB8AC3E}">
+        <p14:creationId xmlns:p14="http://schemas.microsoft.com/office/powerpoint/2010/main" val="3265555956"/>
+      </p:ext>
+    </p:extLst>
+  </p:cSld>
+  <p:clrMapOvr>
+    <a:masterClrMapping/>
+  </p:clrMapOvr>
+</p:notes>
+</file>
+
 <file path=ppt/slideLayouts/slideLayout1.xml><?xml version="1.0" encoding="utf-8"?>
 <p:sldLayout xmlns:a="http://schemas.openxmlformats.org/drawingml/2006/main" xmlns:r="http://schemas.openxmlformats.org/officeDocument/2006/relationships" xmlns:p="http://schemas.openxmlformats.org/presentationml/2006/main" showMasterSp="0" type="title" preserve="1">
   <p:cSld name="Titelfolie">
@@ -974,7 +1059,7 @@
           <a:graphicData uri="http://schemas.openxmlformats.org/presentationml/2006/ole">
             <mc:AlternateContent xmlns:mc="http://schemas.openxmlformats.org/markup-compatibility/2006">
               <mc:Choice xmlns:v="urn:schemas-microsoft-com:vml" Requires="v">
-                <p:oleObj spid="_x0000_s4264" r:id="rId9" imgW="0" imgH="0" progId="TCLayout.ActiveDocument.1">
+                <p:oleObj spid="_x0000_s4266" r:id="rId9" imgW="0" imgH="0" progId="TCLayout.ActiveDocument.1">
                   <p:embed/>
                 </p:oleObj>
               </mc:Choice>
@@ -1211,7 +1296,7 @@
           <a:p>
             <a:r>
               <a:rPr lang="de-DE" altLang="de-DE"/>
-              <a:t>WebApp - Übung 1 | Anwendungssysteme SS 2016</a:t>
+              <a:t>WebApp - Übung 1 | Anwendungssysteme SS 2017</a:t>
             </a:r>
             <a:endParaRPr lang="de-DE" altLang="de-DE" b="0"/>
           </a:p>
@@ -1383,7 +1468,7 @@
           <a:p>
             <a:r>
               <a:rPr lang="de-DE" altLang="de-DE"/>
-              <a:t>WebApp - Übung 1 | Anwendungssysteme SS 2016</a:t>
+              <a:t>WebApp - Übung 1 | Anwendungssysteme SS 2017</a:t>
             </a:r>
             <a:endParaRPr lang="de-DE" altLang="de-DE" b="0"/>
           </a:p>
@@ -1545,7 +1630,7 @@
           <a:p>
             <a:r>
               <a:rPr lang="de-DE" altLang="de-DE"/>
-              <a:t>WebApp - Übung 1 | Anwendungssysteme SS 2016</a:t>
+              <a:t>WebApp - Übung 1 | Anwendungssysteme SS 2017</a:t>
             </a:r>
             <a:endParaRPr lang="de-DE" altLang="de-DE" b="0"/>
           </a:p>
@@ -1730,7 +1815,7 @@
           <a:p>
             <a:r>
               <a:rPr lang="de-DE" altLang="de-DE"/>
-              <a:t>WebApp - Übung 1 | Anwendungssysteme SS 2016</a:t>
+              <a:t>WebApp - Übung 1 | Anwendungssysteme SS 2017</a:t>
             </a:r>
             <a:endParaRPr lang="de-DE" altLang="de-DE" b="0"/>
           </a:p>
@@ -1953,7 +2038,7 @@
           <a:p>
             <a:r>
               <a:rPr lang="de-DE" altLang="de-DE"/>
-              <a:t>WebApp - Übung 1 | Anwendungssysteme SS 2016</a:t>
+              <a:t>WebApp - Übung 1 | Anwendungssysteme SS 2017</a:t>
             </a:r>
             <a:endParaRPr lang="de-DE" altLang="de-DE" b="0"/>
           </a:p>
@@ -2311,7 +2396,7 @@
           <a:p>
             <a:r>
               <a:rPr lang="de-DE" altLang="de-DE"/>
-              <a:t>WebApp - Übung 1 | Anwendungssysteme SS 2016</a:t>
+              <a:t>WebApp - Übung 1 | Anwendungssysteme SS 2017</a:t>
             </a:r>
             <a:endParaRPr lang="de-DE" altLang="de-DE" b="0"/>
           </a:p>
@@ -2422,7 +2507,7 @@
           <a:p>
             <a:r>
               <a:rPr lang="de-DE" altLang="de-DE"/>
-              <a:t>WebApp - Übung 1 | Anwendungssysteme SS 2016</a:t>
+              <a:t>WebApp - Übung 1 | Anwendungssysteme SS 2017</a:t>
             </a:r>
             <a:endParaRPr lang="de-DE" altLang="de-DE" b="0"/>
           </a:p>
@@ -2511,7 +2596,7 @@
           <a:p>
             <a:r>
               <a:rPr lang="de-DE" altLang="de-DE"/>
-              <a:t>WebApp - Übung 1 | Anwendungssysteme SS 2016</a:t>
+              <a:t>WebApp - Übung 1 | Anwendungssysteme SS 2017</a:t>
             </a:r>
             <a:endParaRPr lang="de-DE" altLang="de-DE" b="0"/>
           </a:p>
@@ -2780,7 +2865,7 @@
           <a:p>
             <a:r>
               <a:rPr lang="de-DE" altLang="de-DE"/>
-              <a:t>WebApp - Übung 1 | Anwendungssysteme SS 2016</a:t>
+              <a:t>WebApp - Übung 1 | Anwendungssysteme SS 2017</a:t>
             </a:r>
             <a:endParaRPr lang="de-DE" altLang="de-DE" b="0"/>
           </a:p>
@@ -3029,7 +3114,7 @@
           <a:p>
             <a:r>
               <a:rPr lang="de-DE" altLang="de-DE"/>
-              <a:t>WebApp - Übung 1 | Anwendungssysteme SS 2016</a:t>
+              <a:t>WebApp - Übung 1 | Anwendungssysteme SS 2017</a:t>
             </a:r>
             <a:endParaRPr lang="de-DE" altLang="de-DE" b="0"/>
           </a:p>
@@ -3125,7 +3210,7 @@
           <a:graphicData uri="http://schemas.openxmlformats.org/presentationml/2006/ole">
             <mc:AlternateContent xmlns:mc="http://schemas.openxmlformats.org/markup-compatibility/2006">
               <mc:Choice xmlns:v="urn:schemas-microsoft-com:vml" Requires="v">
-                <p:oleObj spid="_x0000_s1197" r:id="rId20" imgW="0" imgH="0" progId="TCLayout.ActiveDocument.1">
+                <p:oleObj spid="_x0000_s1199" r:id="rId20" imgW="0" imgH="0" progId="TCLayout.ActiveDocument.1">
                   <p:embed/>
                 </p:oleObj>
               </mc:Choice>
@@ -3470,7 +3555,7 @@
           <a:p>
             <a:r>
               <a:rPr lang="de-DE" altLang="de-DE"/>
-              <a:t>WebApp - Übung 1 | Anwendungssysteme SS 2016</a:t>
+              <a:t>WebApp - Übung 1 | Anwendungssysteme SS 2017</a:t>
             </a:r>
             <a:endParaRPr lang="de-DE" altLang="de-DE" b="0"/>
           </a:p>
@@ -4539,7 +4624,7 @@
           <a:p>
             <a:r>
               <a:rPr lang="de-DE" altLang="de-DE"/>
-              <a:t>WebApp - Übung 1 | Anwendungssysteme SS 2016</a:t>
+              <a:t>WebApp - Übung 1 | Anwendungssysteme SS 2017</a:t>
             </a:r>
             <a:endParaRPr lang="de-DE" altLang="de-DE" b="0"/>
           </a:p>
@@ -5217,7 +5302,7 @@
           <a:p>
             <a:r>
               <a:rPr lang="de-DE" altLang="de-DE"/>
-              <a:t>WebApp - Übung 1 | Anwendungssysteme SS 2016</a:t>
+              <a:t>WebApp - Übung 1 | Anwendungssysteme SS 2017</a:t>
             </a:r>
             <a:endParaRPr lang="de-DE" altLang="de-DE" b="0"/>
           </a:p>
@@ -5397,7 +5482,7 @@
           <a:p>
             <a:r>
               <a:rPr lang="de-DE" altLang="de-DE"/>
-              <a:t>WebApp - Übung 1 | Anwendungssysteme SS 2016</a:t>
+              <a:t>WebApp - Übung 1 | Anwendungssysteme SS 2017</a:t>
             </a:r>
             <a:endParaRPr lang="de-DE" altLang="de-DE" b="0"/>
           </a:p>
@@ -6087,7 +6172,7 @@
           <a:p>
             <a:r>
               <a:rPr lang="de-DE" altLang="de-DE"/>
-              <a:t>WebApp - Übung 1 | Anwendungssysteme SS 2016</a:t>
+              <a:t>WebApp - Übung 1 | Anwendungssysteme SS 2017</a:t>
             </a:r>
             <a:endParaRPr lang="de-DE" altLang="de-DE" b="0"/>
           </a:p>
@@ -6912,12 +6997,8 @@
           <a:lstStyle/>
           <a:p>
             <a:r>
-              <a:rPr lang="de-DE" altLang="de-DE" dirty="0" err="1"/>
-              <a:t>WebApp</a:t>
-            </a:r>
-            <a:r>
-              <a:rPr lang="de-DE" altLang="de-DE" dirty="0"/>
-              <a:t> - Übung 1 | Anwendungssysteme SS 2016</a:t>
+              <a:rPr lang="de-DE" altLang="de-DE"/>
+              <a:t>WebApp - Übung 1 | Anwendungssysteme SS 2017</a:t>
             </a:r>
             <a:endParaRPr lang="de-DE" altLang="de-DE" b="0" dirty="0"/>
           </a:p>
@@ -7073,7 +7154,7 @@
           <a:p>
             <a:r>
               <a:rPr lang="de-DE" altLang="de-DE"/>
-              <a:t>WebApp - Übung 1 | Anwendungssysteme SS 2016</a:t>
+              <a:t>WebApp - Übung 1 | Anwendungssysteme SS 2017</a:t>
             </a:r>
             <a:endParaRPr lang="de-DE" altLang="de-DE" b="0"/>
           </a:p>
@@ -7748,7 +7829,7 @@
           <a:p>
             <a:r>
               <a:rPr lang="de-DE" altLang="de-DE"/>
-              <a:t>WebApp - Übung 1 | Anwendungssysteme SS 2016</a:t>
+              <a:t>WebApp - Übung 1 | Anwendungssysteme SS 2017</a:t>
             </a:r>
             <a:endParaRPr lang="de-DE" altLang="de-DE" b="0"/>
           </a:p>
@@ -8561,7 +8642,7 @@
           <a:p>
             <a:r>
               <a:rPr lang="de-DE" altLang="de-DE"/>
-              <a:t>WebApp - Übung 1 | Anwendungssysteme SS 2016</a:t>
+              <a:t>WebApp - Übung 1 | Anwendungssysteme SS 2017</a:t>
             </a:r>
             <a:endParaRPr lang="de-DE" altLang="de-DE" b="0"/>
           </a:p>
@@ -8697,7 +8778,7 @@
           <a:p>
             <a:r>
               <a:rPr lang="de-DE" altLang="de-DE"/>
-              <a:t>WebApp - Übung 1 | Anwendungssysteme SS 2016</a:t>
+              <a:t>WebApp - Übung 1 | Anwendungssysteme SS 2017</a:t>
             </a:r>
             <a:endParaRPr lang="de-DE" altLang="de-DE" b="0"/>
           </a:p>
@@ -9637,7 +9718,7 @@
           <a:p>
             <a:r>
               <a:rPr lang="de-DE" altLang="de-DE"/>
-              <a:t>WebApp - Übung 1 | Anwendungssysteme SS 2016</a:t>
+              <a:t>WebApp - Übung 1 | Anwendungssysteme SS 2017</a:t>
             </a:r>
             <a:endParaRPr lang="de-DE" altLang="de-DE" b="0"/>
           </a:p>
@@ -9796,7 +9877,7 @@
             </a:r>
             <a:r>
               <a:rPr lang="de-DE" sz="1800" dirty="0"/>
-              <a:t> 386458</a:t>
+              <a:t>, 386458</a:t>
             </a:r>
           </a:p>
           <a:p>
@@ -9806,7 +9887,7 @@
             </a:pPr>
             <a:r>
               <a:rPr lang="de-DE" sz="1800" dirty="0"/>
-              <a:t>Robert Koch 386471</a:t>
+              <a:t>Robert Koch, 386471</a:t>
             </a:r>
           </a:p>
           <a:p>
@@ -9816,7 +9897,7 @@
             </a:pPr>
             <a:r>
               <a:rPr lang="de-DE" sz="1800" dirty="0"/>
-              <a:t>Jia Fug Liu 382333</a:t>
+              <a:t>Jia Fug Liu, 382333</a:t>
             </a:r>
           </a:p>
         </p:txBody>
@@ -9838,7 +9919,7 @@
           <a:p>
             <a:r>
               <a:rPr lang="de-DE" altLang="de-DE"/>
-              <a:t>WebApp - Übung 1 | Anwendungssysteme SS 2016</a:t>
+              <a:t>WebApp - Übung 1 | Anwendungssysteme SS 2017</a:t>
             </a:r>
             <a:endParaRPr lang="de-DE" altLang="de-DE" b="0"/>
           </a:p>
@@ -9854,7 +9935,12 @@
             <p:ph type="sldNum" sz="quarter" idx="11"/>
           </p:nvPr>
         </p:nvSpPr>
-        <p:spPr/>
+        <p:spPr>
+          <a:xfrm>
+            <a:off x="539750" y="6557963"/>
+            <a:ext cx="6624638" cy="152400"/>
+          </a:xfrm>
+        </p:spPr>
         <p:txBody>
           <a:bodyPr/>
           <a:lstStyle/>
@@ -10286,7 +10372,7 @@
           <a:p>
             <a:r>
               <a:rPr lang="de-DE" altLang="de-DE"/>
-              <a:t>WebApp - Übung 1 | Anwendungssysteme SS 2016</a:t>
+              <a:t>WebApp - Übung 1 | Anwendungssysteme SS 2017</a:t>
             </a:r>
             <a:endParaRPr lang="de-DE" altLang="de-DE" b="0"/>
           </a:p>
@@ -10466,7 +10552,7 @@
           <a:p>
             <a:r>
               <a:rPr lang="de-DE" altLang="de-DE"/>
-              <a:t>WebApp - Übung 1 | Anwendungssysteme SS 2016</a:t>
+              <a:t>WebApp - Übung 1 | Anwendungssysteme SS 2017</a:t>
             </a:r>
             <a:endParaRPr lang="de-DE" altLang="de-DE" b="0"/>
           </a:p>
@@ -10996,7 +11082,7 @@
           <a:p>
             <a:r>
               <a:rPr lang="de-DE" altLang="de-DE"/>
-              <a:t>WebApp - Übung 1 | Anwendungssysteme SS 2016</a:t>
+              <a:t>WebApp - Übung 1 | Anwendungssysteme SS 2017</a:t>
             </a:r>
             <a:endParaRPr lang="de-DE" altLang="de-DE" b="0"/>
           </a:p>
@@ -11396,7 +11482,7 @@
           <p:nvPr/>
         </p:nvPicPr>
         <p:blipFill>
-          <a:blip r:embed="rId2"/>
+          <a:blip r:embed="rId3"/>
           <a:stretch>
             <a:fillRect/>
           </a:stretch>
@@ -11449,8 +11535,8 @@
         </p:nvSpPr>
         <p:spPr>
           <a:xfrm>
-            <a:off x="539750" y="2893204"/>
-            <a:ext cx="3067739" cy="646331"/>
+            <a:off x="539751" y="2893204"/>
+            <a:ext cx="2880122" cy="646331"/>
           </a:xfrm>
           <a:prstGeom prst="rect">
             <a:avLst/>
@@ -11495,8 +11581,8 @@
         </p:nvSpPr>
         <p:spPr>
           <a:xfrm>
-            <a:off x="539552" y="4759716"/>
-            <a:ext cx="3211755" cy="830997"/>
+            <a:off x="539553" y="4759716"/>
+            <a:ext cx="2557070" cy="1015663"/>
           </a:xfrm>
           <a:prstGeom prst="rect">
             <a:avLst/>
@@ -11640,7 +11726,7 @@
           <a:p>
             <a:r>
               <a:rPr lang="de-DE" altLang="de-DE"/>
-              <a:t>WebApp - Übung 1 | Anwendungssysteme SS 2016</a:t>
+              <a:t>WebApp - Übung 1 | Anwendungssysteme SS 2017</a:t>
             </a:r>
             <a:endParaRPr lang="de-DE" altLang="de-DE" b="0"/>
           </a:p>
@@ -11683,7 +11769,7 @@
           <p:nvPr/>
         </p:nvPicPr>
         <p:blipFill>
-          <a:blip r:embed="rId3"/>
+          <a:blip r:embed="rId4"/>
           <a:stretch>
             <a:fillRect/>
           </a:stretch>
@@ -11698,6 +11784,333 @@
           </a:prstGeom>
         </p:spPr>
       </p:pic>
+      <p:sp>
+        <p:nvSpPr>
+          <p:cNvPr id="12" name="Geschweifte Klammer links 11"/>
+          <p:cNvSpPr/>
+          <p:nvPr/>
+        </p:nvSpPr>
+        <p:spPr>
+          <a:xfrm>
+            <a:off x="3984918" y="3037166"/>
+            <a:ext cx="179233" cy="358406"/>
+          </a:xfrm>
+          <a:prstGeom prst="leftBrace">
+            <a:avLst/>
+          </a:prstGeom>
+          <a:ln>
+            <a:solidFill>
+              <a:srgbClr val="FF0000"/>
+            </a:solidFill>
+          </a:ln>
+        </p:spPr>
+        <p:style>
+          <a:lnRef idx="1">
+            <a:schemeClr val="accent1"/>
+          </a:lnRef>
+          <a:fillRef idx="0">
+            <a:schemeClr val="accent1"/>
+          </a:fillRef>
+          <a:effectRef idx="0">
+            <a:schemeClr val="accent1"/>
+          </a:effectRef>
+          <a:fontRef idx="minor">
+            <a:schemeClr val="tx1"/>
+          </a:fontRef>
+        </p:style>
+        <p:txBody>
+          <a:bodyPr rtlCol="0" anchor="ctr"/>
+          <a:lstStyle/>
+          <a:p>
+            <a:pPr algn="ctr"/>
+            <a:endParaRPr lang="de-DE" dirty="0"/>
+          </a:p>
+        </p:txBody>
+      </p:sp>
+      <p:sp>
+        <p:nvSpPr>
+          <p:cNvPr id="15" name="Geschweifte Klammer links 14"/>
+          <p:cNvSpPr/>
+          <p:nvPr/>
+        </p:nvSpPr>
+        <p:spPr>
+          <a:xfrm>
+            <a:off x="4035865" y="3718005"/>
+            <a:ext cx="179233" cy="358406"/>
+          </a:xfrm>
+          <a:prstGeom prst="leftBrace">
+            <a:avLst/>
+          </a:prstGeom>
+          <a:ln>
+            <a:solidFill>
+              <a:srgbClr val="FF0000"/>
+            </a:solidFill>
+          </a:ln>
+        </p:spPr>
+        <p:style>
+          <a:lnRef idx="1">
+            <a:schemeClr val="accent1"/>
+          </a:lnRef>
+          <a:fillRef idx="0">
+            <a:schemeClr val="accent1"/>
+          </a:fillRef>
+          <a:effectRef idx="0">
+            <a:schemeClr val="accent1"/>
+          </a:effectRef>
+          <a:fontRef idx="minor">
+            <a:schemeClr val="tx1"/>
+          </a:fontRef>
+        </p:style>
+        <p:txBody>
+          <a:bodyPr rtlCol="0" anchor="ctr"/>
+          <a:lstStyle/>
+          <a:p>
+            <a:pPr algn="ctr"/>
+            <a:endParaRPr lang="de-DE" dirty="0"/>
+          </a:p>
+        </p:txBody>
+      </p:sp>
+      <p:sp>
+        <p:nvSpPr>
+          <p:cNvPr id="16" name="Geschweifte Klammer links 15"/>
+          <p:cNvSpPr/>
+          <p:nvPr/>
+        </p:nvSpPr>
+        <p:spPr>
+          <a:xfrm>
+            <a:off x="4035864" y="4417317"/>
+            <a:ext cx="179233" cy="358406"/>
+          </a:xfrm>
+          <a:prstGeom prst="leftBrace">
+            <a:avLst/>
+          </a:prstGeom>
+          <a:ln>
+            <a:solidFill>
+              <a:srgbClr val="FF0000"/>
+            </a:solidFill>
+          </a:ln>
+        </p:spPr>
+        <p:style>
+          <a:lnRef idx="1">
+            <a:schemeClr val="accent1"/>
+          </a:lnRef>
+          <a:fillRef idx="0">
+            <a:schemeClr val="accent1"/>
+          </a:fillRef>
+          <a:effectRef idx="0">
+            <a:schemeClr val="accent1"/>
+          </a:effectRef>
+          <a:fontRef idx="minor">
+            <a:schemeClr val="tx1"/>
+          </a:fontRef>
+        </p:style>
+        <p:txBody>
+          <a:bodyPr rtlCol="0" anchor="ctr"/>
+          <a:lstStyle/>
+          <a:p>
+            <a:pPr algn="ctr"/>
+            <a:endParaRPr lang="de-DE" dirty="0"/>
+          </a:p>
+        </p:txBody>
+      </p:sp>
+      <p:sp>
+        <p:nvSpPr>
+          <p:cNvPr id="19" name="Geschweifte Klammer links 18"/>
+          <p:cNvSpPr/>
+          <p:nvPr/>
+        </p:nvSpPr>
+        <p:spPr>
+          <a:xfrm>
+            <a:off x="4035863" y="5141414"/>
+            <a:ext cx="179233" cy="358406"/>
+          </a:xfrm>
+          <a:prstGeom prst="leftBrace">
+            <a:avLst/>
+          </a:prstGeom>
+          <a:ln>
+            <a:solidFill>
+              <a:srgbClr val="FF0000"/>
+            </a:solidFill>
+          </a:ln>
+        </p:spPr>
+        <p:style>
+          <a:lnRef idx="1">
+            <a:schemeClr val="accent1"/>
+          </a:lnRef>
+          <a:fillRef idx="0">
+            <a:schemeClr val="accent1"/>
+          </a:fillRef>
+          <a:effectRef idx="0">
+            <a:schemeClr val="accent1"/>
+          </a:effectRef>
+          <a:fontRef idx="minor">
+            <a:schemeClr val="tx1"/>
+          </a:fontRef>
+        </p:style>
+        <p:txBody>
+          <a:bodyPr rtlCol="0" anchor="ctr"/>
+          <a:lstStyle/>
+          <a:p>
+            <a:pPr algn="ctr"/>
+            <a:endParaRPr lang="de-DE" dirty="0"/>
+          </a:p>
+        </p:txBody>
+      </p:sp>
+      <p:cxnSp>
+        <p:nvCxnSpPr>
+          <p:cNvPr id="21" name="Gerader Verbinder 20"/>
+          <p:cNvCxnSpPr>
+            <a:cxnSpLocks/>
+            <a:endCxn id="12" idx="1"/>
+          </p:cNvCxnSpPr>
+          <p:nvPr/>
+        </p:nvCxnSpPr>
+        <p:spPr>
+          <a:xfrm>
+            <a:off x="3489651" y="3216369"/>
+            <a:ext cx="495267" cy="0"/>
+          </a:xfrm>
+          <a:prstGeom prst="line">
+            <a:avLst/>
+          </a:prstGeom>
+          <a:ln>
+            <a:solidFill>
+              <a:srgbClr val="FF0000"/>
+            </a:solidFill>
+          </a:ln>
+        </p:spPr>
+        <p:style>
+          <a:lnRef idx="1">
+            <a:schemeClr val="accent1"/>
+          </a:lnRef>
+          <a:fillRef idx="0">
+            <a:schemeClr val="accent1"/>
+          </a:fillRef>
+          <a:effectRef idx="0">
+            <a:schemeClr val="accent1"/>
+          </a:effectRef>
+          <a:fontRef idx="minor">
+            <a:schemeClr val="tx1"/>
+          </a:fontRef>
+        </p:style>
+      </p:cxnSp>
+      <p:cxnSp>
+        <p:nvCxnSpPr>
+          <p:cNvPr id="22" name="Gerader Verbinder 21"/>
+          <p:cNvCxnSpPr>
+            <a:cxnSpLocks/>
+            <a:stCxn id="9" idx="3"/>
+            <a:endCxn id="15" idx="1"/>
+          </p:cNvCxnSpPr>
+          <p:nvPr/>
+        </p:nvCxnSpPr>
+        <p:spPr>
+          <a:xfrm flipV="1">
+            <a:off x="3096623" y="3897208"/>
+            <a:ext cx="939242" cy="1370340"/>
+          </a:xfrm>
+          <a:prstGeom prst="line">
+            <a:avLst/>
+          </a:prstGeom>
+          <a:ln>
+            <a:solidFill>
+              <a:srgbClr val="FF0000"/>
+            </a:solidFill>
+          </a:ln>
+        </p:spPr>
+        <p:style>
+          <a:lnRef idx="1">
+            <a:schemeClr val="accent1"/>
+          </a:lnRef>
+          <a:fillRef idx="0">
+            <a:schemeClr val="accent1"/>
+          </a:fillRef>
+          <a:effectRef idx="0">
+            <a:schemeClr val="accent1"/>
+          </a:effectRef>
+          <a:fontRef idx="minor">
+            <a:schemeClr val="tx1"/>
+          </a:fontRef>
+        </p:style>
+      </p:cxnSp>
+      <p:cxnSp>
+        <p:nvCxnSpPr>
+          <p:cNvPr id="23" name="Gerader Verbinder 22"/>
+          <p:cNvCxnSpPr>
+            <a:cxnSpLocks/>
+            <a:stCxn id="9" idx="3"/>
+            <a:endCxn id="16" idx="1"/>
+          </p:cNvCxnSpPr>
+          <p:nvPr/>
+        </p:nvCxnSpPr>
+        <p:spPr>
+          <a:xfrm flipV="1">
+            <a:off x="3096623" y="4596520"/>
+            <a:ext cx="939241" cy="671028"/>
+          </a:xfrm>
+          <a:prstGeom prst="line">
+            <a:avLst/>
+          </a:prstGeom>
+          <a:ln>
+            <a:solidFill>
+              <a:srgbClr val="FF0000"/>
+            </a:solidFill>
+          </a:ln>
+        </p:spPr>
+        <p:style>
+          <a:lnRef idx="1">
+            <a:schemeClr val="accent1"/>
+          </a:lnRef>
+          <a:fillRef idx="0">
+            <a:schemeClr val="accent1"/>
+          </a:fillRef>
+          <a:effectRef idx="0">
+            <a:schemeClr val="accent1"/>
+          </a:effectRef>
+          <a:fontRef idx="minor">
+            <a:schemeClr val="tx1"/>
+          </a:fontRef>
+        </p:style>
+      </p:cxnSp>
+      <p:cxnSp>
+        <p:nvCxnSpPr>
+          <p:cNvPr id="26" name="Gerader Verbinder 25"/>
+          <p:cNvCxnSpPr>
+            <a:cxnSpLocks/>
+            <a:stCxn id="9" idx="3"/>
+            <a:endCxn id="19" idx="1"/>
+          </p:cNvCxnSpPr>
+          <p:nvPr/>
+        </p:nvCxnSpPr>
+        <p:spPr>
+          <a:xfrm>
+            <a:off x="3096623" y="5267548"/>
+            <a:ext cx="939240" cy="53069"/>
+          </a:xfrm>
+          <a:prstGeom prst="line">
+            <a:avLst/>
+          </a:prstGeom>
+          <a:ln>
+            <a:solidFill>
+              <a:srgbClr val="FF0000"/>
+            </a:solidFill>
+          </a:ln>
+        </p:spPr>
+        <p:style>
+          <a:lnRef idx="1">
+            <a:schemeClr val="accent1"/>
+          </a:lnRef>
+          <a:fillRef idx="0">
+            <a:schemeClr val="accent1"/>
+          </a:fillRef>
+          <a:effectRef idx="0">
+            <a:schemeClr val="accent1"/>
+          </a:effectRef>
+          <a:fontRef idx="minor">
+            <a:schemeClr val="tx1"/>
+          </a:fontRef>
+        </p:style>
+      </p:cxnSp>
     </p:spTree>
     <p:extLst>
       <p:ext uri="{BB962C8B-B14F-4D97-AF65-F5344CB8AC3E}">
@@ -11796,7 +12209,7 @@
           <a:p>
             <a:r>
               <a:rPr lang="de-DE" altLang="de-DE"/>
-              <a:t>WebApp - Übung 1 | Anwendungssysteme SS 2016</a:t>
+              <a:t>WebApp - Übung 1 | Anwendungssysteme SS 2017</a:t>
             </a:r>
             <a:endParaRPr lang="de-DE" altLang="de-DE" b="0"/>
           </a:p>
@@ -12193,7 +12606,7 @@
           <a:p>
             <a:r>
               <a:rPr lang="de-DE" altLang="de-DE"/>
-              <a:t>WebApp - Übung 1 | Anwendungssysteme SS 2016</a:t>
+              <a:t>WebApp - Übung 1 | Anwendungssysteme SS 2017</a:t>
             </a:r>
             <a:endParaRPr lang="de-DE" altLang="de-DE" b="0"/>
           </a:p>
@@ -13031,7 +13444,7 @@
           <a:p>
             <a:r>
               <a:rPr lang="de-DE" altLang="de-DE"/>
-              <a:t>WebApp - Übung 1 | Anwendungssysteme SS 2016</a:t>
+              <a:t>WebApp - Übung 1 | Anwendungssysteme SS 2017</a:t>
             </a:r>
             <a:endParaRPr lang="de-DE" altLang="de-DE" b="0"/>
           </a:p>
@@ -13585,7 +13998,7 @@
           <a:p>
             <a:r>
               <a:rPr lang="de-DE" altLang="de-DE"/>
-              <a:t>WebApp - Übung 1 | Anwendungssysteme SS 2016</a:t>
+              <a:t>WebApp - Übung 1 | Anwendungssysteme SS 2017</a:t>
             </a:r>
             <a:endParaRPr lang="de-DE" altLang="de-DE" b="0"/>
           </a:p>
@@ -13741,7 +14154,7 @@
           <a:p>
             <a:r>
               <a:rPr lang="de-DE" altLang="de-DE"/>
-              <a:t>WebApp - Übung 1 | Anwendungssysteme SS 2016</a:t>
+              <a:t>WebApp - Übung 1 | Anwendungssysteme SS 2017</a:t>
             </a:r>
             <a:endParaRPr lang="de-DE" altLang="de-DE" b="0"/>
           </a:p>
@@ -14335,7 +14748,7 @@
           <a:p>
             <a:r>
               <a:rPr lang="de-DE" altLang="de-DE"/>
-              <a:t>WebApp - Übung 1 | Anwendungssysteme SS 2016</a:t>
+              <a:t>WebApp - Übung 1 | Anwendungssysteme SS 2017</a:t>
             </a:r>
             <a:endParaRPr lang="de-DE" altLang="de-DE" b="0"/>
           </a:p>
@@ -14862,7 +15275,7 @@
           <a:p>
             <a:r>
               <a:rPr lang="de-DE" altLang="de-DE"/>
-              <a:t>WebApp - Übung 1 | Anwendungssysteme SS 2016</a:t>
+              <a:t>WebApp - Übung 1 | Anwendungssysteme SS 2017</a:t>
             </a:r>
             <a:endParaRPr lang="de-DE" altLang="de-DE" b="0"/>
           </a:p>
@@ -15050,7 +15463,7 @@
           <a:p>
             <a:r>
               <a:rPr lang="de-DE" altLang="de-DE"/>
-              <a:t>WebApp - Übung 1 | Anwendungssysteme SS 2016</a:t>
+              <a:t>WebApp - Übung 1 | Anwendungssysteme SS 2017</a:t>
             </a:r>
             <a:endParaRPr lang="de-DE" altLang="de-DE" b="0"/>
           </a:p>
@@ -15182,7 +15595,7 @@
           <a:p>
             <a:r>
               <a:rPr lang="de-DE" altLang="de-DE"/>
-              <a:t>WebApp - Übung 1 | Anwendungssysteme SS 2016</a:t>
+              <a:t>WebApp - Übung 1 | Anwendungssysteme SS 2017</a:t>
             </a:r>
             <a:endParaRPr lang="de-DE" altLang="de-DE" b="0"/>
           </a:p>
@@ -15784,7 +16197,7 @@
           <a:p>
             <a:r>
               <a:rPr lang="de-DE" altLang="de-DE"/>
-              <a:t>WebApp - Übung 1 | Anwendungssysteme SS 2016</a:t>
+              <a:t>WebApp - Übung 1 | Anwendungssysteme SS 2017</a:t>
             </a:r>
             <a:endParaRPr lang="de-DE" altLang="de-DE" b="0"/>
           </a:p>
@@ -16252,7 +16665,7 @@
           <a:p>
             <a:r>
               <a:rPr lang="de-DE" altLang="de-DE"/>
-              <a:t>WebApp - Übung 1 | Anwendungssysteme SS 2016</a:t>
+              <a:t>WebApp - Übung 1 | Anwendungssysteme SS 2017</a:t>
             </a:r>
             <a:endParaRPr lang="de-DE" altLang="de-DE" b="0"/>
           </a:p>
@@ -16777,12 +17190,8 @@
           <a:lstStyle/>
           <a:p>
             <a:r>
-              <a:rPr lang="de-DE" altLang="de-DE" dirty="0" err="1"/>
-              <a:t>WebApp</a:t>
-            </a:r>
-            <a:r>
-              <a:rPr lang="de-DE" altLang="de-DE" dirty="0"/>
-              <a:t> - Übung 1 | Anwendungssysteme SS 2016</a:t>
+              <a:rPr lang="de-DE" altLang="de-DE"/>
+              <a:t>WebApp - Übung 1 | Anwendungssysteme SS 2017</a:t>
             </a:r>
             <a:endParaRPr lang="de-DE" altLang="de-DE" b="0" dirty="0"/>
           </a:p>
@@ -17316,33 +17725,6 @@
       </p:grpSpPr>
       <p:sp>
         <p:nvSpPr>
-          <p:cNvPr id="2" name="Titel 1"/>
-          <p:cNvSpPr>
-            <a:spLocks noGrp="1"/>
-          </p:cNvSpPr>
-          <p:nvPr>
-            <p:ph type="title"/>
-          </p:nvPr>
-        </p:nvSpPr>
-        <p:spPr>
-          <a:xfrm>
-            <a:off x="539750" y="1740115"/>
-            <a:ext cx="8061325" cy="358560"/>
-          </a:xfrm>
-        </p:spPr>
-        <p:txBody>
-          <a:bodyPr/>
-          <a:lstStyle/>
-          <a:p>
-            <a:r>
-              <a:rPr lang="de-DE" dirty="0"/>
-              <a:t>Teammitglieder</a:t>
-            </a:r>
-          </a:p>
-        </p:txBody>
-      </p:sp>
-      <p:sp>
-        <p:nvSpPr>
           <p:cNvPr id="3" name="Fußzeilenplatzhalter 2"/>
           <p:cNvSpPr>
             <a:spLocks noGrp="1"/>
@@ -17358,7 +17740,7 @@
           <a:p>
             <a:r>
               <a:rPr lang="de-DE" altLang="de-DE"/>
-              <a:t>WebApp - Übung 1 | Anwendungssysteme SS 2016</a:t>
+              <a:t>WebApp - Übung 1 | Anwendungssysteme SS 2017</a:t>
             </a:r>
             <a:endParaRPr lang="de-DE" altLang="de-DE" b="0"/>
           </a:p>
@@ -17416,30 +17798,43 @@
           </a:prstGeom>
         </p:spPr>
       </p:pic>
+      <p:sp>
+        <p:nvSpPr>
+          <p:cNvPr id="8" name="Titel 7"/>
+          <p:cNvSpPr>
+            <a:spLocks noGrp="1"/>
+          </p:cNvSpPr>
+          <p:nvPr>
+            <p:ph type="title"/>
+          </p:nvPr>
+        </p:nvSpPr>
+        <p:spPr/>
+        <p:txBody>
+          <a:bodyPr/>
+          <a:lstStyle/>
+          <a:p>
+            <a:endParaRPr lang="de-DE"/>
+          </a:p>
+        </p:txBody>
+      </p:sp>
       <p:pic>
         <p:nvPicPr>
-          <p:cNvPr id="7" name="Grafik 6"/>
+          <p:cNvPr id="9" name="Grafik 8"/>
           <p:cNvPicPr>
             <a:picLocks noChangeAspect="1"/>
           </p:cNvPicPr>
           <p:nvPr/>
         </p:nvPicPr>
         <p:blipFill>
-          <a:blip r:embed="rId3">
-            <a:extLst>
-              <a:ext uri="{28A0092B-C50C-407E-A947-70E740481C1C}">
-                <a14:useLocalDpi xmlns:a14="http://schemas.microsoft.com/office/drawing/2010/main" val="0"/>
-              </a:ext>
-            </a:extLst>
-          </a:blip>
+          <a:blip r:embed="rId3"/>
           <a:stretch>
             <a:fillRect/>
           </a:stretch>
         </p:blipFill>
         <p:spPr>
           <a:xfrm>
-            <a:off x="1691680" y="2098675"/>
-            <a:ext cx="5688632" cy="4202114"/>
+            <a:off x="269874" y="1443444"/>
+            <a:ext cx="8601075" cy="4857344"/>
           </a:xfrm>
           <a:prstGeom prst="rect">
             <a:avLst/>
@@ -17520,7 +17915,7 @@
           <a:p>
             <a:r>
               <a:rPr lang="de-DE" altLang="de-DE"/>
-              <a:t>WebApp - Übung 1 | Anwendungssysteme SS 2016</a:t>
+              <a:t>WebApp - Übung 1 | Anwendungssysteme SS 2017</a:t>
             </a:r>
             <a:endParaRPr lang="de-DE" altLang="de-DE" b="0"/>
           </a:p>
@@ -17771,38 +18166,6 @@
       </p:sp>
       <p:sp>
         <p:nvSpPr>
-          <p:cNvPr id="3" name="Fußzeilenplatzhalter 2"/>
-          <p:cNvSpPr>
-            <a:spLocks noGrp="1"/>
-          </p:cNvSpPr>
-          <p:nvPr>
-            <p:ph type="ftr" sz="quarter" idx="10"/>
-          </p:nvPr>
-        </p:nvSpPr>
-        <p:spPr>
-          <a:xfrm>
-            <a:off x="539750" y="6405563"/>
-            <a:ext cx="6624638" cy="152400"/>
-          </a:xfrm>
-        </p:spPr>
-        <p:txBody>
-          <a:bodyPr/>
-          <a:lstStyle/>
-          <a:p>
-            <a:r>
-              <a:rPr lang="de-DE" altLang="de-DE" dirty="0" err="1"/>
-              <a:t>WebApp</a:t>
-            </a:r>
-            <a:r>
-              <a:rPr lang="de-DE" altLang="de-DE" dirty="0"/>
-              <a:t> - Übung 1 | Anwendungssysteme SS 2016</a:t>
-            </a:r>
-            <a:endParaRPr lang="de-DE" altLang="de-DE" b="0" dirty="0"/>
-          </a:p>
-        </p:txBody>
-      </p:sp>
-      <p:sp>
-        <p:nvSpPr>
           <p:cNvPr id="5" name="Textfeld 4"/>
           <p:cNvSpPr txBox="1"/>
           <p:nvPr/>
@@ -18090,6 +18453,29 @@
           </a:prstGeom>
         </p:spPr>
       </p:pic>
+      <p:sp>
+        <p:nvSpPr>
+          <p:cNvPr id="4" name="Fußzeilenplatzhalter 3"/>
+          <p:cNvSpPr>
+            <a:spLocks noGrp="1"/>
+          </p:cNvSpPr>
+          <p:nvPr>
+            <p:ph type="ftr" sz="quarter" idx="10"/>
+          </p:nvPr>
+        </p:nvSpPr>
+        <p:spPr/>
+        <p:txBody>
+          <a:bodyPr/>
+          <a:lstStyle/>
+          <a:p>
+            <a:r>
+              <a:rPr lang="de-DE" altLang="de-DE"/>
+              <a:t>WebApp - Übung 1 | Anwendungssysteme SS 2017</a:t>
+            </a:r>
+            <a:endParaRPr lang="de-DE" altLang="de-DE" b="0"/>
+          </a:p>
+        </p:txBody>
+      </p:sp>
     </p:spTree>
     <p:extLst>
       <p:ext uri="{BB962C8B-B14F-4D97-AF65-F5344CB8AC3E}">
@@ -18186,7 +18572,7 @@
           <a:p>
             <a:r>
               <a:rPr lang="de-DE" altLang="de-DE"/>
-              <a:t>WebApp - Übung 1 | Anwendungssysteme SS 2016</a:t>
+              <a:t>WebApp - Übung 1 | Anwendungssysteme SS 2017</a:t>
             </a:r>
             <a:endParaRPr lang="de-DE" altLang="de-DE" b="0"/>
           </a:p>
@@ -18623,7 +19009,7 @@
           <a:p>
             <a:r>
               <a:rPr lang="de-DE" altLang="de-DE"/>
-              <a:t>WebApp - Übung 1 | Anwendungssysteme SS 2016</a:t>
+              <a:t>WebApp - Übung 1 | Anwendungssysteme SS 2017</a:t>
             </a:r>
             <a:endParaRPr lang="de-DE" altLang="de-DE" b="0"/>
           </a:p>
@@ -19247,7 +19633,7 @@
           <a:p>
             <a:r>
               <a:rPr lang="de-DE" altLang="de-DE"/>
-              <a:t>WebApp - Übung 1 | Anwendungssysteme SS 2016</a:t>
+              <a:t>WebApp - Übung 1 | Anwendungssysteme SS 2017</a:t>
             </a:r>
             <a:endParaRPr lang="de-DE" altLang="de-DE" b="0"/>
           </a:p>
@@ -19654,7 +20040,7 @@
             <a:pPr algn="l"/>
             <a:r>
               <a:rPr lang="de-DE" dirty="0"/>
-              <a:t>Main Box</a:t>
+              <a:t>Content Box</a:t>
             </a:r>
           </a:p>
         </p:txBody>
@@ -19667,8 +20053,8 @@
         </p:nvSpPr>
         <p:spPr>
           <a:xfrm>
-            <a:off x="7517558" y="5138782"/>
-            <a:ext cx="504056" cy="288032"/>
+            <a:off x="7517557" y="5138782"/>
+            <a:ext cx="703017" cy="276999"/>
           </a:xfrm>
           <a:prstGeom prst="rect">
             <a:avLst/>
@@ -19683,9 +20069,10 @@
           <a:p>
             <a:pPr algn="l"/>
             <a:r>
-              <a:rPr lang="de-DE" dirty="0"/>
-              <a:t>Box</a:t>
-            </a:r>
+              <a:rPr lang="de-DE" dirty="0" err="1"/>
+              <a:t>Footer</a:t>
+            </a:r>
+            <a:endParaRPr lang="de-DE" dirty="0"/>
           </a:p>
         </p:txBody>
       </p:sp>
@@ -19878,7 +20265,7 @@
           <a:p>
             <a:r>
               <a:rPr lang="de-DE" altLang="de-DE"/>
-              <a:t>WebApp - Übung 1 | Anwendungssysteme SS 2016</a:t>
+              <a:t>WebApp - Übung 1 | Anwendungssysteme SS 2017</a:t>
             </a:r>
             <a:endParaRPr lang="de-DE" altLang="de-DE" b="0"/>
           </a:p>

</xml_diff>